<commit_message>
Fixed some UI bugs
</commit_message>
<xml_diff>
--- a/docs/pptx/i_lift_my_eyes.pptx
+++ b/docs/pptx/i_lift_my_eyes.pptx
@@ -206,7 +206,7 @@
           <a:p>
             <a:fld id="{B6DA4868-9473-4A82-8347-0839B24169EE}" type="datetimeFigureOut">
               <a:rPr lang="ko-KR" altLang="en-US" smtClean="0"/>
-              <a:t>2022-03-31</a:t>
+              <a:t>2026. 1. 11.</a:t>
             </a:fld>
             <a:endParaRPr lang="ko-KR" altLang="en-US"/>
           </a:p>
@@ -2348,7 +2348,7 @@
           <a:p>
             <a:fld id="{AE9940A0-3E67-4FB7-BA7E-EAF0C0E0891D}" type="datetimeFigureOut">
               <a:rPr lang="ko-KR" altLang="en-US" smtClean="0"/>
-              <a:t>2022-03-31</a:t>
+              <a:t>2026. 1. 11.</a:t>
             </a:fld>
             <a:endParaRPr lang="ko-KR" altLang="en-US"/>
           </a:p>
@@ -2768,646 +2768,6 @@
           </a:p>
         </p:txBody>
       </p:sp>
-      <p:graphicFrame>
-        <p:nvGraphicFramePr>
-          <p:cNvPr id="2" name="Object 1">
-            <a:hlinkClick r:id="" action="ppaction://ole?verb=0"/>
-            <a:extLst>
-              <a:ext uri="{FF2B5EF4-FFF2-40B4-BE49-F238E27FC236}">
-                <a16:creationId xmlns:a16="http://schemas.microsoft.com/office/drawing/2014/main" id="{8257AB61-F7BD-4001-BDC4-B00F0501B059}"/>
-              </a:ext>
-            </a:extLst>
-          </p:cNvPr>
-          <p:cNvGraphicFramePr>
-            <a:graphicFrameLocks noChangeAspect="1"/>
-          </p:cNvGraphicFramePr>
-          <p:nvPr>
-            <p:extLst>
-              <p:ext uri="{D42A27DB-BD31-4B8C-83A1-F6EECF244321}">
-                <p14:modId xmlns:p14="http://schemas.microsoft.com/office/powerpoint/2010/main" val="3228633943"/>
-              </p:ext>
-            </p:extLst>
-          </p:nvPr>
-        </p:nvGraphicFramePr>
-        <p:xfrm>
-          <a:off x="1416050" y="230188"/>
-          <a:ext cx="6096000" cy="3429000"/>
-        </p:xfrm>
-        <a:graphic>
-          <a:graphicData uri="http://schemas.openxmlformats.org/presentationml/2006/ole">
-            <mc:AlternateContent xmlns:mc="http://schemas.openxmlformats.org/markup-compatibility/2006">
-              <mc:Choice xmlns:v="urn:schemas-microsoft-com:vml" Requires="v">
-                <p:oleObj spid="_x0000_s1026" name="Presentation" r:id="rId4" imgW="6096296" imgH="3429229" progId="PowerPoint.Show.12">
-                  <p:embed/>
-                </p:oleObj>
-              </mc:Choice>
-              <mc:Fallback>
-                <p:oleObj name="Presentation" r:id="rId4" imgW="6096296" imgH="3429229" progId="PowerPoint.Show.12">
-                  <p:embed/>
-                  <p:pic>
-                    <p:nvPicPr>
-                      <p:cNvPr id="0" name=""/>
-                      <p:cNvPicPr/>
-                      <p:nvPr/>
-                    </p:nvPicPr>
-                    <p:blipFill>
-                      <a:blip r:embed="rId5"/>
-                      <a:stretch>
-                        <a:fillRect/>
-                      </a:stretch>
-                    </p:blipFill>
-                    <p:spPr>
-                      <a:xfrm>
-                        <a:off x="1416050" y="230188"/>
-                        <a:ext cx="6096000" cy="3429000"/>
-                      </a:xfrm>
-                      <a:prstGeom prst="rect">
-                        <a:avLst/>
-                      </a:prstGeom>
-                    </p:spPr>
-                  </p:pic>
-                </p:oleObj>
-              </mc:Fallback>
-            </mc:AlternateContent>
-          </a:graphicData>
-        </a:graphic>
-      </p:graphicFrame>
-      <p:graphicFrame>
-        <p:nvGraphicFramePr>
-          <p:cNvPr id="3" name="Object 2">
-            <a:hlinkClick r:id="" action="ppaction://ole?verb=0"/>
-            <a:extLst>
-              <a:ext uri="{FF2B5EF4-FFF2-40B4-BE49-F238E27FC236}">
-                <a16:creationId xmlns:a16="http://schemas.microsoft.com/office/drawing/2014/main" id="{A640A0E1-730B-462D-92A5-33B98BC8D633}"/>
-              </a:ext>
-            </a:extLst>
-          </p:cNvPr>
-          <p:cNvGraphicFramePr>
-            <a:graphicFrameLocks noChangeAspect="1"/>
-          </p:cNvGraphicFramePr>
-          <p:nvPr>
-            <p:extLst>
-              <p:ext uri="{D42A27DB-BD31-4B8C-83A1-F6EECF244321}">
-                <p14:modId xmlns:p14="http://schemas.microsoft.com/office/powerpoint/2010/main" val="1777199025"/>
-              </p:ext>
-            </p:extLst>
-          </p:nvPr>
-        </p:nvGraphicFramePr>
-        <p:xfrm>
-          <a:off x="1514475" y="328613"/>
-          <a:ext cx="6096000" cy="3429000"/>
-        </p:xfrm>
-        <a:graphic>
-          <a:graphicData uri="http://schemas.openxmlformats.org/presentationml/2006/ole">
-            <mc:AlternateContent xmlns:mc="http://schemas.openxmlformats.org/markup-compatibility/2006">
-              <mc:Choice xmlns:v="urn:schemas-microsoft-com:vml" Requires="v">
-                <p:oleObj spid="_x0000_s1027" name="Presentation" r:id="rId6" imgW="6096296" imgH="3429229" progId="PowerPoint.Show.12">
-                  <p:embed/>
-                </p:oleObj>
-              </mc:Choice>
-              <mc:Fallback>
-                <p:oleObj name="Presentation" r:id="rId6" imgW="6096296" imgH="3429229" progId="PowerPoint.Show.12">
-                  <p:embed/>
-                  <p:pic>
-                    <p:nvPicPr>
-                      <p:cNvPr id="0" name=""/>
-                      <p:cNvPicPr/>
-                      <p:nvPr/>
-                    </p:nvPicPr>
-                    <p:blipFill>
-                      <a:blip r:embed="rId5"/>
-                      <a:stretch>
-                        <a:fillRect/>
-                      </a:stretch>
-                    </p:blipFill>
-                    <p:spPr>
-                      <a:xfrm>
-                        <a:off x="1514475" y="328613"/>
-                        <a:ext cx="6096000" cy="3429000"/>
-                      </a:xfrm>
-                      <a:prstGeom prst="rect">
-                        <a:avLst/>
-                      </a:prstGeom>
-                    </p:spPr>
-                  </p:pic>
-                </p:oleObj>
-              </mc:Fallback>
-            </mc:AlternateContent>
-          </a:graphicData>
-        </a:graphic>
-      </p:graphicFrame>
-      <p:graphicFrame>
-        <p:nvGraphicFramePr>
-          <p:cNvPr id="6" name="Object 5">
-            <a:hlinkClick r:id="" action="ppaction://ole?verb=0"/>
-            <a:extLst>
-              <a:ext uri="{FF2B5EF4-FFF2-40B4-BE49-F238E27FC236}">
-                <a16:creationId xmlns:a16="http://schemas.microsoft.com/office/drawing/2014/main" id="{ED488D3B-49FE-4780-9BB2-DCA09335E3AB}"/>
-              </a:ext>
-            </a:extLst>
-          </p:cNvPr>
-          <p:cNvGraphicFramePr>
-            <a:graphicFrameLocks noChangeAspect="1"/>
-          </p:cNvGraphicFramePr>
-          <p:nvPr>
-            <p:extLst>
-              <p:ext uri="{D42A27DB-BD31-4B8C-83A1-F6EECF244321}">
-                <p14:modId xmlns:p14="http://schemas.microsoft.com/office/powerpoint/2010/main" val="4089338588"/>
-              </p:ext>
-            </p:extLst>
-          </p:nvPr>
-        </p:nvGraphicFramePr>
-        <p:xfrm>
-          <a:off x="1612900" y="427038"/>
-          <a:ext cx="6096000" cy="3429000"/>
-        </p:xfrm>
-        <a:graphic>
-          <a:graphicData uri="http://schemas.openxmlformats.org/presentationml/2006/ole">
-            <mc:AlternateContent xmlns:mc="http://schemas.openxmlformats.org/markup-compatibility/2006">
-              <mc:Choice xmlns:v="urn:schemas-microsoft-com:vml" Requires="v">
-                <p:oleObj spid="_x0000_s1028" name="Presentation" r:id="rId7" imgW="6096296" imgH="3429229" progId="PowerPoint.Show.12">
-                  <p:embed/>
-                </p:oleObj>
-              </mc:Choice>
-              <mc:Fallback>
-                <p:oleObj name="Presentation" r:id="rId7" imgW="6096296" imgH="3429229" progId="PowerPoint.Show.12">
-                  <p:embed/>
-                  <p:pic>
-                    <p:nvPicPr>
-                      <p:cNvPr id="0" name=""/>
-                      <p:cNvPicPr/>
-                      <p:nvPr/>
-                    </p:nvPicPr>
-                    <p:blipFill>
-                      <a:blip r:embed="rId5"/>
-                      <a:stretch>
-                        <a:fillRect/>
-                      </a:stretch>
-                    </p:blipFill>
-                    <p:spPr>
-                      <a:xfrm>
-                        <a:off x="1612900" y="427038"/>
-                        <a:ext cx="6096000" cy="3429000"/>
-                      </a:xfrm>
-                      <a:prstGeom prst="rect">
-                        <a:avLst/>
-                      </a:prstGeom>
-                    </p:spPr>
-                  </p:pic>
-                </p:oleObj>
-              </mc:Fallback>
-            </mc:AlternateContent>
-          </a:graphicData>
-        </a:graphic>
-      </p:graphicFrame>
-      <p:graphicFrame>
-        <p:nvGraphicFramePr>
-          <p:cNvPr id="7" name="Object 6">
-            <a:hlinkClick r:id="" action="ppaction://ole?verb=0"/>
-            <a:extLst>
-              <a:ext uri="{FF2B5EF4-FFF2-40B4-BE49-F238E27FC236}">
-                <a16:creationId xmlns:a16="http://schemas.microsoft.com/office/drawing/2014/main" id="{5607A327-E822-477F-B5B1-EEF844930BDE}"/>
-              </a:ext>
-            </a:extLst>
-          </p:cNvPr>
-          <p:cNvGraphicFramePr>
-            <a:graphicFrameLocks noChangeAspect="1"/>
-          </p:cNvGraphicFramePr>
-          <p:nvPr>
-            <p:extLst>
-              <p:ext uri="{D42A27DB-BD31-4B8C-83A1-F6EECF244321}">
-                <p14:modId xmlns:p14="http://schemas.microsoft.com/office/powerpoint/2010/main" val="2798621047"/>
-              </p:ext>
-            </p:extLst>
-          </p:nvPr>
-        </p:nvGraphicFramePr>
-        <p:xfrm>
-          <a:off x="1711325" y="525463"/>
-          <a:ext cx="6096000" cy="3429000"/>
-        </p:xfrm>
-        <a:graphic>
-          <a:graphicData uri="http://schemas.openxmlformats.org/presentationml/2006/ole">
-            <mc:AlternateContent xmlns:mc="http://schemas.openxmlformats.org/markup-compatibility/2006">
-              <mc:Choice xmlns:v="urn:schemas-microsoft-com:vml" Requires="v">
-                <p:oleObj spid="_x0000_s1029" name="Presentation" r:id="rId8" imgW="6096296" imgH="3429229" progId="PowerPoint.Show.12">
-                  <p:embed/>
-                </p:oleObj>
-              </mc:Choice>
-              <mc:Fallback>
-                <p:oleObj name="Presentation" r:id="rId8" imgW="6096296" imgH="3429229" progId="PowerPoint.Show.12">
-                  <p:embed/>
-                  <p:pic>
-                    <p:nvPicPr>
-                      <p:cNvPr id="0" name=""/>
-                      <p:cNvPicPr/>
-                      <p:nvPr/>
-                    </p:nvPicPr>
-                    <p:blipFill>
-                      <a:blip r:embed="rId5"/>
-                      <a:stretch>
-                        <a:fillRect/>
-                      </a:stretch>
-                    </p:blipFill>
-                    <p:spPr>
-                      <a:xfrm>
-                        <a:off x="1711325" y="525463"/>
-                        <a:ext cx="6096000" cy="3429000"/>
-                      </a:xfrm>
-                      <a:prstGeom prst="rect">
-                        <a:avLst/>
-                      </a:prstGeom>
-                    </p:spPr>
-                  </p:pic>
-                </p:oleObj>
-              </mc:Fallback>
-            </mc:AlternateContent>
-          </a:graphicData>
-        </a:graphic>
-      </p:graphicFrame>
-      <p:graphicFrame>
-        <p:nvGraphicFramePr>
-          <p:cNvPr id="8" name="Object 7">
-            <a:hlinkClick r:id="" action="ppaction://ole?verb=0"/>
-            <a:extLst>
-              <a:ext uri="{FF2B5EF4-FFF2-40B4-BE49-F238E27FC236}">
-                <a16:creationId xmlns:a16="http://schemas.microsoft.com/office/drawing/2014/main" id="{3C6056C3-DDCB-4430-833D-CC8EFF6DA27E}"/>
-              </a:ext>
-            </a:extLst>
-          </p:cNvPr>
-          <p:cNvGraphicFramePr>
-            <a:graphicFrameLocks noChangeAspect="1"/>
-          </p:cNvGraphicFramePr>
-          <p:nvPr>
-            <p:extLst>
-              <p:ext uri="{D42A27DB-BD31-4B8C-83A1-F6EECF244321}">
-                <p14:modId xmlns:p14="http://schemas.microsoft.com/office/powerpoint/2010/main" val="4077173976"/>
-              </p:ext>
-            </p:extLst>
-          </p:nvPr>
-        </p:nvGraphicFramePr>
-        <p:xfrm>
-          <a:off x="1809750" y="623888"/>
-          <a:ext cx="6096000" cy="3429000"/>
-        </p:xfrm>
-        <a:graphic>
-          <a:graphicData uri="http://schemas.openxmlformats.org/presentationml/2006/ole">
-            <mc:AlternateContent xmlns:mc="http://schemas.openxmlformats.org/markup-compatibility/2006">
-              <mc:Choice xmlns:v="urn:schemas-microsoft-com:vml" Requires="v">
-                <p:oleObj spid="_x0000_s1030" name="Presentation" r:id="rId9" imgW="6096296" imgH="3429229" progId="PowerPoint.Show.12">
-                  <p:embed/>
-                </p:oleObj>
-              </mc:Choice>
-              <mc:Fallback>
-                <p:oleObj name="Presentation" r:id="rId9" imgW="6096296" imgH="3429229" progId="PowerPoint.Show.12">
-                  <p:embed/>
-                  <p:pic>
-                    <p:nvPicPr>
-                      <p:cNvPr id="0" name=""/>
-                      <p:cNvPicPr/>
-                      <p:nvPr/>
-                    </p:nvPicPr>
-                    <p:blipFill>
-                      <a:blip r:embed="rId5"/>
-                      <a:stretch>
-                        <a:fillRect/>
-                      </a:stretch>
-                    </p:blipFill>
-                    <p:spPr>
-                      <a:xfrm>
-                        <a:off x="1809750" y="623888"/>
-                        <a:ext cx="6096000" cy="3429000"/>
-                      </a:xfrm>
-                      <a:prstGeom prst="rect">
-                        <a:avLst/>
-                      </a:prstGeom>
-                    </p:spPr>
-                  </p:pic>
-                </p:oleObj>
-              </mc:Fallback>
-            </mc:AlternateContent>
-          </a:graphicData>
-        </a:graphic>
-      </p:graphicFrame>
-      <p:graphicFrame>
-        <p:nvGraphicFramePr>
-          <p:cNvPr id="9" name="Object 8">
-            <a:hlinkClick r:id="" action="ppaction://ole?verb=0"/>
-            <a:extLst>
-              <a:ext uri="{FF2B5EF4-FFF2-40B4-BE49-F238E27FC236}">
-                <a16:creationId xmlns:a16="http://schemas.microsoft.com/office/drawing/2014/main" id="{1ADA89B2-2987-4364-9C1B-F1E86D40B44C}"/>
-              </a:ext>
-            </a:extLst>
-          </p:cNvPr>
-          <p:cNvGraphicFramePr>
-            <a:graphicFrameLocks noChangeAspect="1"/>
-          </p:cNvGraphicFramePr>
-          <p:nvPr>
-            <p:extLst>
-              <p:ext uri="{D42A27DB-BD31-4B8C-83A1-F6EECF244321}">
-                <p14:modId xmlns:p14="http://schemas.microsoft.com/office/powerpoint/2010/main" val="2273851568"/>
-              </p:ext>
-            </p:extLst>
-          </p:nvPr>
-        </p:nvGraphicFramePr>
-        <p:xfrm>
-          <a:off x="1908175" y="722313"/>
-          <a:ext cx="6096000" cy="3429000"/>
-        </p:xfrm>
-        <a:graphic>
-          <a:graphicData uri="http://schemas.openxmlformats.org/presentationml/2006/ole">
-            <mc:AlternateContent xmlns:mc="http://schemas.openxmlformats.org/markup-compatibility/2006">
-              <mc:Choice xmlns:v="urn:schemas-microsoft-com:vml" Requires="v">
-                <p:oleObj spid="_x0000_s1031" name="Presentation" r:id="rId10" imgW="6096296" imgH="3429229" progId="PowerPoint.Show.12">
-                  <p:embed/>
-                </p:oleObj>
-              </mc:Choice>
-              <mc:Fallback>
-                <p:oleObj name="Presentation" r:id="rId10" imgW="6096296" imgH="3429229" progId="PowerPoint.Show.12">
-                  <p:embed/>
-                  <p:pic>
-                    <p:nvPicPr>
-                      <p:cNvPr id="0" name=""/>
-                      <p:cNvPicPr/>
-                      <p:nvPr/>
-                    </p:nvPicPr>
-                    <p:blipFill>
-                      <a:blip r:embed="rId5"/>
-                      <a:stretch>
-                        <a:fillRect/>
-                      </a:stretch>
-                    </p:blipFill>
-                    <p:spPr>
-                      <a:xfrm>
-                        <a:off x="1908175" y="722313"/>
-                        <a:ext cx="6096000" cy="3429000"/>
-                      </a:xfrm>
-                      <a:prstGeom prst="rect">
-                        <a:avLst/>
-                      </a:prstGeom>
-                    </p:spPr>
-                  </p:pic>
-                </p:oleObj>
-              </mc:Fallback>
-            </mc:AlternateContent>
-          </a:graphicData>
-        </a:graphic>
-      </p:graphicFrame>
-      <p:graphicFrame>
-        <p:nvGraphicFramePr>
-          <p:cNvPr id="10" name="Object 9">
-            <a:hlinkClick r:id="" action="ppaction://ole?verb=0"/>
-            <a:extLst>
-              <a:ext uri="{FF2B5EF4-FFF2-40B4-BE49-F238E27FC236}">
-                <a16:creationId xmlns:a16="http://schemas.microsoft.com/office/drawing/2014/main" id="{4895BA8E-37C9-4BB0-9A03-E590E9E0B784}"/>
-              </a:ext>
-            </a:extLst>
-          </p:cNvPr>
-          <p:cNvGraphicFramePr>
-            <a:graphicFrameLocks noChangeAspect="1"/>
-          </p:cNvGraphicFramePr>
-          <p:nvPr>
-            <p:extLst>
-              <p:ext uri="{D42A27DB-BD31-4B8C-83A1-F6EECF244321}">
-                <p14:modId xmlns:p14="http://schemas.microsoft.com/office/powerpoint/2010/main" val="2143363839"/>
-              </p:ext>
-            </p:extLst>
-          </p:nvPr>
-        </p:nvGraphicFramePr>
-        <p:xfrm>
-          <a:off x="2006600" y="820738"/>
-          <a:ext cx="6096000" cy="3429000"/>
-        </p:xfrm>
-        <a:graphic>
-          <a:graphicData uri="http://schemas.openxmlformats.org/presentationml/2006/ole">
-            <mc:AlternateContent xmlns:mc="http://schemas.openxmlformats.org/markup-compatibility/2006">
-              <mc:Choice xmlns:v="urn:schemas-microsoft-com:vml" Requires="v">
-                <p:oleObj spid="_x0000_s1032" name="Presentation" r:id="rId11" imgW="6096296" imgH="3429229" progId="PowerPoint.Show.12">
-                  <p:embed/>
-                </p:oleObj>
-              </mc:Choice>
-              <mc:Fallback>
-                <p:oleObj name="Presentation" r:id="rId11" imgW="6096296" imgH="3429229" progId="PowerPoint.Show.12">
-                  <p:embed/>
-                  <p:pic>
-                    <p:nvPicPr>
-                      <p:cNvPr id="0" name=""/>
-                      <p:cNvPicPr/>
-                      <p:nvPr/>
-                    </p:nvPicPr>
-                    <p:blipFill>
-                      <a:blip r:embed="rId5"/>
-                      <a:stretch>
-                        <a:fillRect/>
-                      </a:stretch>
-                    </p:blipFill>
-                    <p:spPr>
-                      <a:xfrm>
-                        <a:off x="2006600" y="820738"/>
-                        <a:ext cx="6096000" cy="3429000"/>
-                      </a:xfrm>
-                      <a:prstGeom prst="rect">
-                        <a:avLst/>
-                      </a:prstGeom>
-                    </p:spPr>
-                  </p:pic>
-                </p:oleObj>
-              </mc:Fallback>
-            </mc:AlternateContent>
-          </a:graphicData>
-        </a:graphic>
-      </p:graphicFrame>
-      <p:graphicFrame>
-        <p:nvGraphicFramePr>
-          <p:cNvPr id="11" name="Object 10">
-            <a:hlinkClick r:id="" action="ppaction://ole?verb=0"/>
-            <a:extLst>
-              <a:ext uri="{FF2B5EF4-FFF2-40B4-BE49-F238E27FC236}">
-                <a16:creationId xmlns:a16="http://schemas.microsoft.com/office/drawing/2014/main" id="{A61BF896-AEDF-434F-A262-FEAD74A0E5D9}"/>
-              </a:ext>
-            </a:extLst>
-          </p:cNvPr>
-          <p:cNvGraphicFramePr>
-            <a:graphicFrameLocks noChangeAspect="1"/>
-          </p:cNvGraphicFramePr>
-          <p:nvPr>
-            <p:extLst>
-              <p:ext uri="{D42A27DB-BD31-4B8C-83A1-F6EECF244321}">
-                <p14:modId xmlns:p14="http://schemas.microsoft.com/office/powerpoint/2010/main" val="957012929"/>
-              </p:ext>
-            </p:extLst>
-          </p:nvPr>
-        </p:nvGraphicFramePr>
-        <p:xfrm>
-          <a:off x="2105025" y="919163"/>
-          <a:ext cx="6096000" cy="3429000"/>
-        </p:xfrm>
-        <a:graphic>
-          <a:graphicData uri="http://schemas.openxmlformats.org/presentationml/2006/ole">
-            <mc:AlternateContent xmlns:mc="http://schemas.openxmlformats.org/markup-compatibility/2006">
-              <mc:Choice xmlns:v="urn:schemas-microsoft-com:vml" Requires="v">
-                <p:oleObj spid="_x0000_s1033" name="Presentation" r:id="rId12" imgW="6096296" imgH="3429229" progId="PowerPoint.Show.12">
-                  <p:embed/>
-                </p:oleObj>
-              </mc:Choice>
-              <mc:Fallback>
-                <p:oleObj name="Presentation" r:id="rId12" imgW="6096296" imgH="3429229" progId="PowerPoint.Show.12">
-                  <p:embed/>
-                  <p:pic>
-                    <p:nvPicPr>
-                      <p:cNvPr id="0" name=""/>
-                      <p:cNvPicPr/>
-                      <p:nvPr/>
-                    </p:nvPicPr>
-                    <p:blipFill>
-                      <a:blip r:embed="rId5"/>
-                      <a:stretch>
-                        <a:fillRect/>
-                      </a:stretch>
-                    </p:blipFill>
-                    <p:spPr>
-                      <a:xfrm>
-                        <a:off x="2105025" y="919163"/>
-                        <a:ext cx="6096000" cy="3429000"/>
-                      </a:xfrm>
-                      <a:prstGeom prst="rect">
-                        <a:avLst/>
-                      </a:prstGeom>
-                    </p:spPr>
-                  </p:pic>
-                </p:oleObj>
-              </mc:Fallback>
-            </mc:AlternateContent>
-          </a:graphicData>
-        </a:graphic>
-      </p:graphicFrame>
-      <p:graphicFrame>
-        <p:nvGraphicFramePr>
-          <p:cNvPr id="12" name="Object 11">
-            <a:hlinkClick r:id="" action="ppaction://ole?verb=0"/>
-            <a:extLst>
-              <a:ext uri="{FF2B5EF4-FFF2-40B4-BE49-F238E27FC236}">
-                <a16:creationId xmlns:a16="http://schemas.microsoft.com/office/drawing/2014/main" id="{ADDD86E1-982B-4C41-996F-0D5081FE5E8A}"/>
-              </a:ext>
-            </a:extLst>
-          </p:cNvPr>
-          <p:cNvGraphicFramePr>
-            <a:graphicFrameLocks noChangeAspect="1"/>
-          </p:cNvGraphicFramePr>
-          <p:nvPr>
-            <p:extLst>
-              <p:ext uri="{D42A27DB-BD31-4B8C-83A1-F6EECF244321}">
-                <p14:modId xmlns:p14="http://schemas.microsoft.com/office/powerpoint/2010/main" val="1569111089"/>
-              </p:ext>
-            </p:extLst>
-          </p:nvPr>
-        </p:nvGraphicFramePr>
-        <p:xfrm>
-          <a:off x="2203450" y="1017588"/>
-          <a:ext cx="6096000" cy="3429000"/>
-        </p:xfrm>
-        <a:graphic>
-          <a:graphicData uri="http://schemas.openxmlformats.org/presentationml/2006/ole">
-            <mc:AlternateContent xmlns:mc="http://schemas.openxmlformats.org/markup-compatibility/2006">
-              <mc:Choice xmlns:v="urn:schemas-microsoft-com:vml" Requires="v">
-                <p:oleObj spid="_x0000_s1034" name="Presentation" r:id="rId13" imgW="6096296" imgH="3429229" progId="PowerPoint.Show.12">
-                  <p:embed/>
-                </p:oleObj>
-              </mc:Choice>
-              <mc:Fallback>
-                <p:oleObj name="Presentation" r:id="rId13" imgW="6096296" imgH="3429229" progId="PowerPoint.Show.12">
-                  <p:embed/>
-                  <p:pic>
-                    <p:nvPicPr>
-                      <p:cNvPr id="0" name=""/>
-                      <p:cNvPicPr/>
-                      <p:nvPr/>
-                    </p:nvPicPr>
-                    <p:blipFill>
-                      <a:blip r:embed="rId5"/>
-                      <a:stretch>
-                        <a:fillRect/>
-                      </a:stretch>
-                    </p:blipFill>
-                    <p:spPr>
-                      <a:xfrm>
-                        <a:off x="2203450" y="1017588"/>
-                        <a:ext cx="6096000" cy="3429000"/>
-                      </a:xfrm>
-                      <a:prstGeom prst="rect">
-                        <a:avLst/>
-                      </a:prstGeom>
-                    </p:spPr>
-                  </p:pic>
-                </p:oleObj>
-              </mc:Fallback>
-            </mc:AlternateContent>
-          </a:graphicData>
-        </a:graphic>
-      </p:graphicFrame>
-      <p:graphicFrame>
-        <p:nvGraphicFramePr>
-          <p:cNvPr id="13" name="Object 12">
-            <a:hlinkClick r:id="" action="ppaction://ole?verb=0"/>
-            <a:extLst>
-              <a:ext uri="{FF2B5EF4-FFF2-40B4-BE49-F238E27FC236}">
-                <a16:creationId xmlns:a16="http://schemas.microsoft.com/office/drawing/2014/main" id="{F967D396-C552-43B4-9A04-F3B3156F401E}"/>
-              </a:ext>
-            </a:extLst>
-          </p:cNvPr>
-          <p:cNvGraphicFramePr>
-            <a:graphicFrameLocks noChangeAspect="1"/>
-          </p:cNvGraphicFramePr>
-          <p:nvPr>
-            <p:extLst>
-              <p:ext uri="{D42A27DB-BD31-4B8C-83A1-F6EECF244321}">
-                <p14:modId xmlns:p14="http://schemas.microsoft.com/office/powerpoint/2010/main" val="1236442995"/>
-              </p:ext>
-            </p:extLst>
-          </p:nvPr>
-        </p:nvGraphicFramePr>
-        <p:xfrm>
-          <a:off x="2301875" y="1116013"/>
-          <a:ext cx="6096000" cy="3429000"/>
-        </p:xfrm>
-        <a:graphic>
-          <a:graphicData uri="http://schemas.openxmlformats.org/presentationml/2006/ole">
-            <mc:AlternateContent xmlns:mc="http://schemas.openxmlformats.org/markup-compatibility/2006">
-              <mc:Choice xmlns:v="urn:schemas-microsoft-com:vml" Requires="v">
-                <p:oleObj spid="_x0000_s1035" name="Presentation" r:id="rId14" imgW="6096296" imgH="3429229" progId="PowerPoint.Show.12">
-                  <p:embed/>
-                </p:oleObj>
-              </mc:Choice>
-              <mc:Fallback>
-                <p:oleObj name="Presentation" r:id="rId14" imgW="6096296" imgH="3429229" progId="PowerPoint.Show.12">
-                  <p:embed/>
-                  <p:pic>
-                    <p:nvPicPr>
-                      <p:cNvPr id="0" name=""/>
-                      <p:cNvPicPr/>
-                      <p:nvPr/>
-                    </p:nvPicPr>
-                    <p:blipFill>
-                      <a:blip r:embed="rId5"/>
-                      <a:stretch>
-                        <a:fillRect/>
-                      </a:stretch>
-                    </p:blipFill>
-                    <p:spPr>
-                      <a:xfrm>
-                        <a:off x="2301875" y="1116013"/>
-                        <a:ext cx="6096000" cy="3429000"/>
-                      </a:xfrm>
-                      <a:prstGeom prst="rect">
-                        <a:avLst/>
-                      </a:prstGeom>
-                    </p:spPr>
-                  </p:pic>
-                </p:oleObj>
-              </mc:Fallback>
-            </mc:AlternateContent>
-          </a:graphicData>
-        </a:graphic>
-      </p:graphicFrame>
     </p:spTree>
   </p:cSld>
   <p:clrMapOvr>

</xml_diff>

<commit_message>
chore: automation for 5d995a3f2951ba7515deae53f6344c2f1fdf6e06
</commit_message>
<xml_diff>
--- a/docs/pptx/i_lift_my_eyes.pptx
+++ b/docs/pptx/i_lift_my_eyes.pptx
@@ -206,7 +206,7 @@
           <a:p>
             <a:fld id="{B6DA4868-9473-4A82-8347-0839B24169EE}" type="datetimeFigureOut">
               <a:rPr lang="ko-KR" altLang="en-US" smtClean="0"/>
-              <a:t>2026. 1. 11.</a:t>
+              <a:t>2022-03-31</a:t>
             </a:fld>
             <a:endParaRPr lang="ko-KR" altLang="en-US"/>
           </a:p>
@@ -2348,7 +2348,7 @@
           <a:p>
             <a:fld id="{AE9940A0-3E67-4FB7-BA7E-EAF0C0E0891D}" type="datetimeFigureOut">
               <a:rPr lang="ko-KR" altLang="en-US" smtClean="0"/>
-              <a:t>2026. 1. 11.</a:t>
+              <a:t>2022-03-31</a:t>
             </a:fld>
             <a:endParaRPr lang="ko-KR" altLang="en-US"/>
           </a:p>
@@ -2768,6 +2768,646 @@
           </a:p>
         </p:txBody>
       </p:sp>
+      <p:graphicFrame>
+        <p:nvGraphicFramePr>
+          <p:cNvPr id="2" name="Object 1">
+            <a:hlinkClick r:id="" action="ppaction://ole?verb=0"/>
+            <a:extLst>
+              <a:ext uri="{FF2B5EF4-FFF2-40B4-BE49-F238E27FC236}">
+                <a16:creationId xmlns:a16="http://schemas.microsoft.com/office/drawing/2014/main" id="{8257AB61-F7BD-4001-BDC4-B00F0501B059}"/>
+              </a:ext>
+            </a:extLst>
+          </p:cNvPr>
+          <p:cNvGraphicFramePr>
+            <a:graphicFrameLocks noChangeAspect="1"/>
+          </p:cNvGraphicFramePr>
+          <p:nvPr>
+            <p:extLst>
+              <p:ext uri="{D42A27DB-BD31-4B8C-83A1-F6EECF244321}">
+                <p14:modId xmlns:p14="http://schemas.microsoft.com/office/powerpoint/2010/main" val="3228633943"/>
+              </p:ext>
+            </p:extLst>
+          </p:nvPr>
+        </p:nvGraphicFramePr>
+        <p:xfrm>
+          <a:off x="1416050" y="230188"/>
+          <a:ext cx="6096000" cy="3429000"/>
+        </p:xfrm>
+        <a:graphic>
+          <a:graphicData uri="http://schemas.openxmlformats.org/presentationml/2006/ole">
+            <mc:AlternateContent xmlns:mc="http://schemas.openxmlformats.org/markup-compatibility/2006">
+              <mc:Choice xmlns:v="urn:schemas-microsoft-com:vml" Requires="v">
+                <p:oleObj spid="_x0000_s1026" name="Presentation" r:id="rId4" imgW="6096296" imgH="3429229" progId="PowerPoint.Show.12">
+                  <p:embed/>
+                </p:oleObj>
+              </mc:Choice>
+              <mc:Fallback>
+                <p:oleObj name="Presentation" r:id="rId4" imgW="6096296" imgH="3429229" progId="PowerPoint.Show.12">
+                  <p:embed/>
+                  <p:pic>
+                    <p:nvPicPr>
+                      <p:cNvPr id="0" name=""/>
+                      <p:cNvPicPr/>
+                      <p:nvPr/>
+                    </p:nvPicPr>
+                    <p:blipFill>
+                      <a:blip r:embed="rId5"/>
+                      <a:stretch>
+                        <a:fillRect/>
+                      </a:stretch>
+                    </p:blipFill>
+                    <p:spPr>
+                      <a:xfrm>
+                        <a:off x="1416050" y="230188"/>
+                        <a:ext cx="6096000" cy="3429000"/>
+                      </a:xfrm>
+                      <a:prstGeom prst="rect">
+                        <a:avLst/>
+                      </a:prstGeom>
+                    </p:spPr>
+                  </p:pic>
+                </p:oleObj>
+              </mc:Fallback>
+            </mc:AlternateContent>
+          </a:graphicData>
+        </a:graphic>
+      </p:graphicFrame>
+      <p:graphicFrame>
+        <p:nvGraphicFramePr>
+          <p:cNvPr id="3" name="Object 2">
+            <a:hlinkClick r:id="" action="ppaction://ole?verb=0"/>
+            <a:extLst>
+              <a:ext uri="{FF2B5EF4-FFF2-40B4-BE49-F238E27FC236}">
+                <a16:creationId xmlns:a16="http://schemas.microsoft.com/office/drawing/2014/main" id="{A640A0E1-730B-462D-92A5-33B98BC8D633}"/>
+              </a:ext>
+            </a:extLst>
+          </p:cNvPr>
+          <p:cNvGraphicFramePr>
+            <a:graphicFrameLocks noChangeAspect="1"/>
+          </p:cNvGraphicFramePr>
+          <p:nvPr>
+            <p:extLst>
+              <p:ext uri="{D42A27DB-BD31-4B8C-83A1-F6EECF244321}">
+                <p14:modId xmlns:p14="http://schemas.microsoft.com/office/powerpoint/2010/main" val="1777199025"/>
+              </p:ext>
+            </p:extLst>
+          </p:nvPr>
+        </p:nvGraphicFramePr>
+        <p:xfrm>
+          <a:off x="1514475" y="328613"/>
+          <a:ext cx="6096000" cy="3429000"/>
+        </p:xfrm>
+        <a:graphic>
+          <a:graphicData uri="http://schemas.openxmlformats.org/presentationml/2006/ole">
+            <mc:AlternateContent xmlns:mc="http://schemas.openxmlformats.org/markup-compatibility/2006">
+              <mc:Choice xmlns:v="urn:schemas-microsoft-com:vml" Requires="v">
+                <p:oleObj spid="_x0000_s1027" name="Presentation" r:id="rId6" imgW="6096296" imgH="3429229" progId="PowerPoint.Show.12">
+                  <p:embed/>
+                </p:oleObj>
+              </mc:Choice>
+              <mc:Fallback>
+                <p:oleObj name="Presentation" r:id="rId6" imgW="6096296" imgH="3429229" progId="PowerPoint.Show.12">
+                  <p:embed/>
+                  <p:pic>
+                    <p:nvPicPr>
+                      <p:cNvPr id="0" name=""/>
+                      <p:cNvPicPr/>
+                      <p:nvPr/>
+                    </p:nvPicPr>
+                    <p:blipFill>
+                      <a:blip r:embed="rId5"/>
+                      <a:stretch>
+                        <a:fillRect/>
+                      </a:stretch>
+                    </p:blipFill>
+                    <p:spPr>
+                      <a:xfrm>
+                        <a:off x="1514475" y="328613"/>
+                        <a:ext cx="6096000" cy="3429000"/>
+                      </a:xfrm>
+                      <a:prstGeom prst="rect">
+                        <a:avLst/>
+                      </a:prstGeom>
+                    </p:spPr>
+                  </p:pic>
+                </p:oleObj>
+              </mc:Fallback>
+            </mc:AlternateContent>
+          </a:graphicData>
+        </a:graphic>
+      </p:graphicFrame>
+      <p:graphicFrame>
+        <p:nvGraphicFramePr>
+          <p:cNvPr id="6" name="Object 5">
+            <a:hlinkClick r:id="" action="ppaction://ole?verb=0"/>
+            <a:extLst>
+              <a:ext uri="{FF2B5EF4-FFF2-40B4-BE49-F238E27FC236}">
+                <a16:creationId xmlns:a16="http://schemas.microsoft.com/office/drawing/2014/main" id="{ED488D3B-49FE-4780-9BB2-DCA09335E3AB}"/>
+              </a:ext>
+            </a:extLst>
+          </p:cNvPr>
+          <p:cNvGraphicFramePr>
+            <a:graphicFrameLocks noChangeAspect="1"/>
+          </p:cNvGraphicFramePr>
+          <p:nvPr>
+            <p:extLst>
+              <p:ext uri="{D42A27DB-BD31-4B8C-83A1-F6EECF244321}">
+                <p14:modId xmlns:p14="http://schemas.microsoft.com/office/powerpoint/2010/main" val="4089338588"/>
+              </p:ext>
+            </p:extLst>
+          </p:nvPr>
+        </p:nvGraphicFramePr>
+        <p:xfrm>
+          <a:off x="1612900" y="427038"/>
+          <a:ext cx="6096000" cy="3429000"/>
+        </p:xfrm>
+        <a:graphic>
+          <a:graphicData uri="http://schemas.openxmlformats.org/presentationml/2006/ole">
+            <mc:AlternateContent xmlns:mc="http://schemas.openxmlformats.org/markup-compatibility/2006">
+              <mc:Choice xmlns:v="urn:schemas-microsoft-com:vml" Requires="v">
+                <p:oleObj spid="_x0000_s1028" name="Presentation" r:id="rId7" imgW="6096296" imgH="3429229" progId="PowerPoint.Show.12">
+                  <p:embed/>
+                </p:oleObj>
+              </mc:Choice>
+              <mc:Fallback>
+                <p:oleObj name="Presentation" r:id="rId7" imgW="6096296" imgH="3429229" progId="PowerPoint.Show.12">
+                  <p:embed/>
+                  <p:pic>
+                    <p:nvPicPr>
+                      <p:cNvPr id="0" name=""/>
+                      <p:cNvPicPr/>
+                      <p:nvPr/>
+                    </p:nvPicPr>
+                    <p:blipFill>
+                      <a:blip r:embed="rId5"/>
+                      <a:stretch>
+                        <a:fillRect/>
+                      </a:stretch>
+                    </p:blipFill>
+                    <p:spPr>
+                      <a:xfrm>
+                        <a:off x="1612900" y="427038"/>
+                        <a:ext cx="6096000" cy="3429000"/>
+                      </a:xfrm>
+                      <a:prstGeom prst="rect">
+                        <a:avLst/>
+                      </a:prstGeom>
+                    </p:spPr>
+                  </p:pic>
+                </p:oleObj>
+              </mc:Fallback>
+            </mc:AlternateContent>
+          </a:graphicData>
+        </a:graphic>
+      </p:graphicFrame>
+      <p:graphicFrame>
+        <p:nvGraphicFramePr>
+          <p:cNvPr id="7" name="Object 6">
+            <a:hlinkClick r:id="" action="ppaction://ole?verb=0"/>
+            <a:extLst>
+              <a:ext uri="{FF2B5EF4-FFF2-40B4-BE49-F238E27FC236}">
+                <a16:creationId xmlns:a16="http://schemas.microsoft.com/office/drawing/2014/main" id="{5607A327-E822-477F-B5B1-EEF844930BDE}"/>
+              </a:ext>
+            </a:extLst>
+          </p:cNvPr>
+          <p:cNvGraphicFramePr>
+            <a:graphicFrameLocks noChangeAspect="1"/>
+          </p:cNvGraphicFramePr>
+          <p:nvPr>
+            <p:extLst>
+              <p:ext uri="{D42A27DB-BD31-4B8C-83A1-F6EECF244321}">
+                <p14:modId xmlns:p14="http://schemas.microsoft.com/office/powerpoint/2010/main" val="2798621047"/>
+              </p:ext>
+            </p:extLst>
+          </p:nvPr>
+        </p:nvGraphicFramePr>
+        <p:xfrm>
+          <a:off x="1711325" y="525463"/>
+          <a:ext cx="6096000" cy="3429000"/>
+        </p:xfrm>
+        <a:graphic>
+          <a:graphicData uri="http://schemas.openxmlformats.org/presentationml/2006/ole">
+            <mc:AlternateContent xmlns:mc="http://schemas.openxmlformats.org/markup-compatibility/2006">
+              <mc:Choice xmlns:v="urn:schemas-microsoft-com:vml" Requires="v">
+                <p:oleObj spid="_x0000_s1029" name="Presentation" r:id="rId8" imgW="6096296" imgH="3429229" progId="PowerPoint.Show.12">
+                  <p:embed/>
+                </p:oleObj>
+              </mc:Choice>
+              <mc:Fallback>
+                <p:oleObj name="Presentation" r:id="rId8" imgW="6096296" imgH="3429229" progId="PowerPoint.Show.12">
+                  <p:embed/>
+                  <p:pic>
+                    <p:nvPicPr>
+                      <p:cNvPr id="0" name=""/>
+                      <p:cNvPicPr/>
+                      <p:nvPr/>
+                    </p:nvPicPr>
+                    <p:blipFill>
+                      <a:blip r:embed="rId5"/>
+                      <a:stretch>
+                        <a:fillRect/>
+                      </a:stretch>
+                    </p:blipFill>
+                    <p:spPr>
+                      <a:xfrm>
+                        <a:off x="1711325" y="525463"/>
+                        <a:ext cx="6096000" cy="3429000"/>
+                      </a:xfrm>
+                      <a:prstGeom prst="rect">
+                        <a:avLst/>
+                      </a:prstGeom>
+                    </p:spPr>
+                  </p:pic>
+                </p:oleObj>
+              </mc:Fallback>
+            </mc:AlternateContent>
+          </a:graphicData>
+        </a:graphic>
+      </p:graphicFrame>
+      <p:graphicFrame>
+        <p:nvGraphicFramePr>
+          <p:cNvPr id="8" name="Object 7">
+            <a:hlinkClick r:id="" action="ppaction://ole?verb=0"/>
+            <a:extLst>
+              <a:ext uri="{FF2B5EF4-FFF2-40B4-BE49-F238E27FC236}">
+                <a16:creationId xmlns:a16="http://schemas.microsoft.com/office/drawing/2014/main" id="{3C6056C3-DDCB-4430-833D-CC8EFF6DA27E}"/>
+              </a:ext>
+            </a:extLst>
+          </p:cNvPr>
+          <p:cNvGraphicFramePr>
+            <a:graphicFrameLocks noChangeAspect="1"/>
+          </p:cNvGraphicFramePr>
+          <p:nvPr>
+            <p:extLst>
+              <p:ext uri="{D42A27DB-BD31-4B8C-83A1-F6EECF244321}">
+                <p14:modId xmlns:p14="http://schemas.microsoft.com/office/powerpoint/2010/main" val="4077173976"/>
+              </p:ext>
+            </p:extLst>
+          </p:nvPr>
+        </p:nvGraphicFramePr>
+        <p:xfrm>
+          <a:off x="1809750" y="623888"/>
+          <a:ext cx="6096000" cy="3429000"/>
+        </p:xfrm>
+        <a:graphic>
+          <a:graphicData uri="http://schemas.openxmlformats.org/presentationml/2006/ole">
+            <mc:AlternateContent xmlns:mc="http://schemas.openxmlformats.org/markup-compatibility/2006">
+              <mc:Choice xmlns:v="urn:schemas-microsoft-com:vml" Requires="v">
+                <p:oleObj spid="_x0000_s1030" name="Presentation" r:id="rId9" imgW="6096296" imgH="3429229" progId="PowerPoint.Show.12">
+                  <p:embed/>
+                </p:oleObj>
+              </mc:Choice>
+              <mc:Fallback>
+                <p:oleObj name="Presentation" r:id="rId9" imgW="6096296" imgH="3429229" progId="PowerPoint.Show.12">
+                  <p:embed/>
+                  <p:pic>
+                    <p:nvPicPr>
+                      <p:cNvPr id="0" name=""/>
+                      <p:cNvPicPr/>
+                      <p:nvPr/>
+                    </p:nvPicPr>
+                    <p:blipFill>
+                      <a:blip r:embed="rId5"/>
+                      <a:stretch>
+                        <a:fillRect/>
+                      </a:stretch>
+                    </p:blipFill>
+                    <p:spPr>
+                      <a:xfrm>
+                        <a:off x="1809750" y="623888"/>
+                        <a:ext cx="6096000" cy="3429000"/>
+                      </a:xfrm>
+                      <a:prstGeom prst="rect">
+                        <a:avLst/>
+                      </a:prstGeom>
+                    </p:spPr>
+                  </p:pic>
+                </p:oleObj>
+              </mc:Fallback>
+            </mc:AlternateContent>
+          </a:graphicData>
+        </a:graphic>
+      </p:graphicFrame>
+      <p:graphicFrame>
+        <p:nvGraphicFramePr>
+          <p:cNvPr id="9" name="Object 8">
+            <a:hlinkClick r:id="" action="ppaction://ole?verb=0"/>
+            <a:extLst>
+              <a:ext uri="{FF2B5EF4-FFF2-40B4-BE49-F238E27FC236}">
+                <a16:creationId xmlns:a16="http://schemas.microsoft.com/office/drawing/2014/main" id="{1ADA89B2-2987-4364-9C1B-F1E86D40B44C}"/>
+              </a:ext>
+            </a:extLst>
+          </p:cNvPr>
+          <p:cNvGraphicFramePr>
+            <a:graphicFrameLocks noChangeAspect="1"/>
+          </p:cNvGraphicFramePr>
+          <p:nvPr>
+            <p:extLst>
+              <p:ext uri="{D42A27DB-BD31-4B8C-83A1-F6EECF244321}">
+                <p14:modId xmlns:p14="http://schemas.microsoft.com/office/powerpoint/2010/main" val="2273851568"/>
+              </p:ext>
+            </p:extLst>
+          </p:nvPr>
+        </p:nvGraphicFramePr>
+        <p:xfrm>
+          <a:off x="1908175" y="722313"/>
+          <a:ext cx="6096000" cy="3429000"/>
+        </p:xfrm>
+        <a:graphic>
+          <a:graphicData uri="http://schemas.openxmlformats.org/presentationml/2006/ole">
+            <mc:AlternateContent xmlns:mc="http://schemas.openxmlformats.org/markup-compatibility/2006">
+              <mc:Choice xmlns:v="urn:schemas-microsoft-com:vml" Requires="v">
+                <p:oleObj spid="_x0000_s1031" name="Presentation" r:id="rId10" imgW="6096296" imgH="3429229" progId="PowerPoint.Show.12">
+                  <p:embed/>
+                </p:oleObj>
+              </mc:Choice>
+              <mc:Fallback>
+                <p:oleObj name="Presentation" r:id="rId10" imgW="6096296" imgH="3429229" progId="PowerPoint.Show.12">
+                  <p:embed/>
+                  <p:pic>
+                    <p:nvPicPr>
+                      <p:cNvPr id="0" name=""/>
+                      <p:cNvPicPr/>
+                      <p:nvPr/>
+                    </p:nvPicPr>
+                    <p:blipFill>
+                      <a:blip r:embed="rId5"/>
+                      <a:stretch>
+                        <a:fillRect/>
+                      </a:stretch>
+                    </p:blipFill>
+                    <p:spPr>
+                      <a:xfrm>
+                        <a:off x="1908175" y="722313"/>
+                        <a:ext cx="6096000" cy="3429000"/>
+                      </a:xfrm>
+                      <a:prstGeom prst="rect">
+                        <a:avLst/>
+                      </a:prstGeom>
+                    </p:spPr>
+                  </p:pic>
+                </p:oleObj>
+              </mc:Fallback>
+            </mc:AlternateContent>
+          </a:graphicData>
+        </a:graphic>
+      </p:graphicFrame>
+      <p:graphicFrame>
+        <p:nvGraphicFramePr>
+          <p:cNvPr id="10" name="Object 9">
+            <a:hlinkClick r:id="" action="ppaction://ole?verb=0"/>
+            <a:extLst>
+              <a:ext uri="{FF2B5EF4-FFF2-40B4-BE49-F238E27FC236}">
+                <a16:creationId xmlns:a16="http://schemas.microsoft.com/office/drawing/2014/main" id="{4895BA8E-37C9-4BB0-9A03-E590E9E0B784}"/>
+              </a:ext>
+            </a:extLst>
+          </p:cNvPr>
+          <p:cNvGraphicFramePr>
+            <a:graphicFrameLocks noChangeAspect="1"/>
+          </p:cNvGraphicFramePr>
+          <p:nvPr>
+            <p:extLst>
+              <p:ext uri="{D42A27DB-BD31-4B8C-83A1-F6EECF244321}">
+                <p14:modId xmlns:p14="http://schemas.microsoft.com/office/powerpoint/2010/main" val="2143363839"/>
+              </p:ext>
+            </p:extLst>
+          </p:nvPr>
+        </p:nvGraphicFramePr>
+        <p:xfrm>
+          <a:off x="2006600" y="820738"/>
+          <a:ext cx="6096000" cy="3429000"/>
+        </p:xfrm>
+        <a:graphic>
+          <a:graphicData uri="http://schemas.openxmlformats.org/presentationml/2006/ole">
+            <mc:AlternateContent xmlns:mc="http://schemas.openxmlformats.org/markup-compatibility/2006">
+              <mc:Choice xmlns:v="urn:schemas-microsoft-com:vml" Requires="v">
+                <p:oleObj spid="_x0000_s1032" name="Presentation" r:id="rId11" imgW="6096296" imgH="3429229" progId="PowerPoint.Show.12">
+                  <p:embed/>
+                </p:oleObj>
+              </mc:Choice>
+              <mc:Fallback>
+                <p:oleObj name="Presentation" r:id="rId11" imgW="6096296" imgH="3429229" progId="PowerPoint.Show.12">
+                  <p:embed/>
+                  <p:pic>
+                    <p:nvPicPr>
+                      <p:cNvPr id="0" name=""/>
+                      <p:cNvPicPr/>
+                      <p:nvPr/>
+                    </p:nvPicPr>
+                    <p:blipFill>
+                      <a:blip r:embed="rId5"/>
+                      <a:stretch>
+                        <a:fillRect/>
+                      </a:stretch>
+                    </p:blipFill>
+                    <p:spPr>
+                      <a:xfrm>
+                        <a:off x="2006600" y="820738"/>
+                        <a:ext cx="6096000" cy="3429000"/>
+                      </a:xfrm>
+                      <a:prstGeom prst="rect">
+                        <a:avLst/>
+                      </a:prstGeom>
+                    </p:spPr>
+                  </p:pic>
+                </p:oleObj>
+              </mc:Fallback>
+            </mc:AlternateContent>
+          </a:graphicData>
+        </a:graphic>
+      </p:graphicFrame>
+      <p:graphicFrame>
+        <p:nvGraphicFramePr>
+          <p:cNvPr id="11" name="Object 10">
+            <a:hlinkClick r:id="" action="ppaction://ole?verb=0"/>
+            <a:extLst>
+              <a:ext uri="{FF2B5EF4-FFF2-40B4-BE49-F238E27FC236}">
+                <a16:creationId xmlns:a16="http://schemas.microsoft.com/office/drawing/2014/main" id="{A61BF896-AEDF-434F-A262-FEAD74A0E5D9}"/>
+              </a:ext>
+            </a:extLst>
+          </p:cNvPr>
+          <p:cNvGraphicFramePr>
+            <a:graphicFrameLocks noChangeAspect="1"/>
+          </p:cNvGraphicFramePr>
+          <p:nvPr>
+            <p:extLst>
+              <p:ext uri="{D42A27DB-BD31-4B8C-83A1-F6EECF244321}">
+                <p14:modId xmlns:p14="http://schemas.microsoft.com/office/powerpoint/2010/main" val="957012929"/>
+              </p:ext>
+            </p:extLst>
+          </p:nvPr>
+        </p:nvGraphicFramePr>
+        <p:xfrm>
+          <a:off x="2105025" y="919163"/>
+          <a:ext cx="6096000" cy="3429000"/>
+        </p:xfrm>
+        <a:graphic>
+          <a:graphicData uri="http://schemas.openxmlformats.org/presentationml/2006/ole">
+            <mc:AlternateContent xmlns:mc="http://schemas.openxmlformats.org/markup-compatibility/2006">
+              <mc:Choice xmlns:v="urn:schemas-microsoft-com:vml" Requires="v">
+                <p:oleObj spid="_x0000_s1033" name="Presentation" r:id="rId12" imgW="6096296" imgH="3429229" progId="PowerPoint.Show.12">
+                  <p:embed/>
+                </p:oleObj>
+              </mc:Choice>
+              <mc:Fallback>
+                <p:oleObj name="Presentation" r:id="rId12" imgW="6096296" imgH="3429229" progId="PowerPoint.Show.12">
+                  <p:embed/>
+                  <p:pic>
+                    <p:nvPicPr>
+                      <p:cNvPr id="0" name=""/>
+                      <p:cNvPicPr/>
+                      <p:nvPr/>
+                    </p:nvPicPr>
+                    <p:blipFill>
+                      <a:blip r:embed="rId5"/>
+                      <a:stretch>
+                        <a:fillRect/>
+                      </a:stretch>
+                    </p:blipFill>
+                    <p:spPr>
+                      <a:xfrm>
+                        <a:off x="2105025" y="919163"/>
+                        <a:ext cx="6096000" cy="3429000"/>
+                      </a:xfrm>
+                      <a:prstGeom prst="rect">
+                        <a:avLst/>
+                      </a:prstGeom>
+                    </p:spPr>
+                  </p:pic>
+                </p:oleObj>
+              </mc:Fallback>
+            </mc:AlternateContent>
+          </a:graphicData>
+        </a:graphic>
+      </p:graphicFrame>
+      <p:graphicFrame>
+        <p:nvGraphicFramePr>
+          <p:cNvPr id="12" name="Object 11">
+            <a:hlinkClick r:id="" action="ppaction://ole?verb=0"/>
+            <a:extLst>
+              <a:ext uri="{FF2B5EF4-FFF2-40B4-BE49-F238E27FC236}">
+                <a16:creationId xmlns:a16="http://schemas.microsoft.com/office/drawing/2014/main" id="{ADDD86E1-982B-4C41-996F-0D5081FE5E8A}"/>
+              </a:ext>
+            </a:extLst>
+          </p:cNvPr>
+          <p:cNvGraphicFramePr>
+            <a:graphicFrameLocks noChangeAspect="1"/>
+          </p:cNvGraphicFramePr>
+          <p:nvPr>
+            <p:extLst>
+              <p:ext uri="{D42A27DB-BD31-4B8C-83A1-F6EECF244321}">
+                <p14:modId xmlns:p14="http://schemas.microsoft.com/office/powerpoint/2010/main" val="1569111089"/>
+              </p:ext>
+            </p:extLst>
+          </p:nvPr>
+        </p:nvGraphicFramePr>
+        <p:xfrm>
+          <a:off x="2203450" y="1017588"/>
+          <a:ext cx="6096000" cy="3429000"/>
+        </p:xfrm>
+        <a:graphic>
+          <a:graphicData uri="http://schemas.openxmlformats.org/presentationml/2006/ole">
+            <mc:AlternateContent xmlns:mc="http://schemas.openxmlformats.org/markup-compatibility/2006">
+              <mc:Choice xmlns:v="urn:schemas-microsoft-com:vml" Requires="v">
+                <p:oleObj spid="_x0000_s1034" name="Presentation" r:id="rId13" imgW="6096296" imgH="3429229" progId="PowerPoint.Show.12">
+                  <p:embed/>
+                </p:oleObj>
+              </mc:Choice>
+              <mc:Fallback>
+                <p:oleObj name="Presentation" r:id="rId13" imgW="6096296" imgH="3429229" progId="PowerPoint.Show.12">
+                  <p:embed/>
+                  <p:pic>
+                    <p:nvPicPr>
+                      <p:cNvPr id="0" name=""/>
+                      <p:cNvPicPr/>
+                      <p:nvPr/>
+                    </p:nvPicPr>
+                    <p:blipFill>
+                      <a:blip r:embed="rId5"/>
+                      <a:stretch>
+                        <a:fillRect/>
+                      </a:stretch>
+                    </p:blipFill>
+                    <p:spPr>
+                      <a:xfrm>
+                        <a:off x="2203450" y="1017588"/>
+                        <a:ext cx="6096000" cy="3429000"/>
+                      </a:xfrm>
+                      <a:prstGeom prst="rect">
+                        <a:avLst/>
+                      </a:prstGeom>
+                    </p:spPr>
+                  </p:pic>
+                </p:oleObj>
+              </mc:Fallback>
+            </mc:AlternateContent>
+          </a:graphicData>
+        </a:graphic>
+      </p:graphicFrame>
+      <p:graphicFrame>
+        <p:nvGraphicFramePr>
+          <p:cNvPr id="13" name="Object 12">
+            <a:hlinkClick r:id="" action="ppaction://ole?verb=0"/>
+            <a:extLst>
+              <a:ext uri="{FF2B5EF4-FFF2-40B4-BE49-F238E27FC236}">
+                <a16:creationId xmlns:a16="http://schemas.microsoft.com/office/drawing/2014/main" id="{F967D396-C552-43B4-9A04-F3B3156F401E}"/>
+              </a:ext>
+            </a:extLst>
+          </p:cNvPr>
+          <p:cNvGraphicFramePr>
+            <a:graphicFrameLocks noChangeAspect="1"/>
+          </p:cNvGraphicFramePr>
+          <p:nvPr>
+            <p:extLst>
+              <p:ext uri="{D42A27DB-BD31-4B8C-83A1-F6EECF244321}">
+                <p14:modId xmlns:p14="http://schemas.microsoft.com/office/powerpoint/2010/main" val="1236442995"/>
+              </p:ext>
+            </p:extLst>
+          </p:nvPr>
+        </p:nvGraphicFramePr>
+        <p:xfrm>
+          <a:off x="2301875" y="1116013"/>
+          <a:ext cx="6096000" cy="3429000"/>
+        </p:xfrm>
+        <a:graphic>
+          <a:graphicData uri="http://schemas.openxmlformats.org/presentationml/2006/ole">
+            <mc:AlternateContent xmlns:mc="http://schemas.openxmlformats.org/markup-compatibility/2006">
+              <mc:Choice xmlns:v="urn:schemas-microsoft-com:vml" Requires="v">
+                <p:oleObj spid="_x0000_s1035" name="Presentation" r:id="rId14" imgW="6096296" imgH="3429229" progId="PowerPoint.Show.12">
+                  <p:embed/>
+                </p:oleObj>
+              </mc:Choice>
+              <mc:Fallback>
+                <p:oleObj name="Presentation" r:id="rId14" imgW="6096296" imgH="3429229" progId="PowerPoint.Show.12">
+                  <p:embed/>
+                  <p:pic>
+                    <p:nvPicPr>
+                      <p:cNvPr id="0" name=""/>
+                      <p:cNvPicPr/>
+                      <p:nvPr/>
+                    </p:nvPicPr>
+                    <p:blipFill>
+                      <a:blip r:embed="rId5"/>
+                      <a:stretch>
+                        <a:fillRect/>
+                      </a:stretch>
+                    </p:blipFill>
+                    <p:spPr>
+                      <a:xfrm>
+                        <a:off x="2301875" y="1116013"/>
+                        <a:ext cx="6096000" cy="3429000"/>
+                      </a:xfrm>
+                      <a:prstGeom prst="rect">
+                        <a:avLst/>
+                      </a:prstGeom>
+                    </p:spPr>
+                  </p:pic>
+                </p:oleObj>
+              </mc:Fallback>
+            </mc:AlternateContent>
+          </a:graphicData>
+        </a:graphic>
+      </p:graphicFrame>
     </p:spTree>
   </p:cSld>
   <p:clrMapOvr>

</xml_diff>

<commit_message>
chore: automation for b84da3e45a5f80fecbd6a18eb526017c4eb40ced
</commit_message>
<xml_diff>
--- a/docs/pptx/i_lift_my_eyes.pptx
+++ b/docs/pptx/i_lift_my_eyes.pptx
@@ -206,7 +206,7 @@
           <a:p>
             <a:fld id="{B6DA4868-9473-4A82-8347-0839B24169EE}" type="datetimeFigureOut">
               <a:rPr lang="ko-KR" altLang="en-US" smtClean="0"/>
-              <a:t>2026. 2. 8.</a:t>
+              <a:t>2022-03-31</a:t>
             </a:fld>
             <a:endParaRPr lang="ko-KR" altLang="en-US"/>
           </a:p>
@@ -2348,7 +2348,7 @@
           <a:p>
             <a:fld id="{AE9940A0-3E67-4FB7-BA7E-EAF0C0E0891D}" type="datetimeFigureOut">
               <a:rPr lang="ko-KR" altLang="en-US" smtClean="0"/>
-              <a:t>2026. 2. 8.</a:t>
+              <a:t>2022-03-31</a:t>
             </a:fld>
             <a:endParaRPr lang="ko-KR" altLang="en-US"/>
           </a:p>
@@ -2768,6 +2768,646 @@
           </a:p>
         </p:txBody>
       </p:sp>
+      <p:graphicFrame>
+        <p:nvGraphicFramePr>
+          <p:cNvPr id="2" name="Object 1">
+            <a:hlinkClick r:id="" action="ppaction://ole?verb=0"/>
+            <a:extLst>
+              <a:ext uri="{FF2B5EF4-FFF2-40B4-BE49-F238E27FC236}">
+                <a16:creationId xmlns:a16="http://schemas.microsoft.com/office/drawing/2014/main" id="{8257AB61-F7BD-4001-BDC4-B00F0501B059}"/>
+              </a:ext>
+            </a:extLst>
+          </p:cNvPr>
+          <p:cNvGraphicFramePr>
+            <a:graphicFrameLocks noChangeAspect="1"/>
+          </p:cNvGraphicFramePr>
+          <p:nvPr>
+            <p:extLst>
+              <p:ext uri="{D42A27DB-BD31-4B8C-83A1-F6EECF244321}">
+                <p14:modId xmlns:p14="http://schemas.microsoft.com/office/powerpoint/2010/main" val="3228633943"/>
+              </p:ext>
+            </p:extLst>
+          </p:nvPr>
+        </p:nvGraphicFramePr>
+        <p:xfrm>
+          <a:off x="1416050" y="230188"/>
+          <a:ext cx="6096000" cy="3429000"/>
+        </p:xfrm>
+        <a:graphic>
+          <a:graphicData uri="http://schemas.openxmlformats.org/presentationml/2006/ole">
+            <mc:AlternateContent xmlns:mc="http://schemas.openxmlformats.org/markup-compatibility/2006">
+              <mc:Choice xmlns:v="urn:schemas-microsoft-com:vml" Requires="v">
+                <p:oleObj spid="_x0000_s1026" name="Presentation" r:id="rId4" imgW="6096296" imgH="3429229" progId="PowerPoint.Show.12">
+                  <p:embed/>
+                </p:oleObj>
+              </mc:Choice>
+              <mc:Fallback>
+                <p:oleObj name="Presentation" r:id="rId4" imgW="6096296" imgH="3429229" progId="PowerPoint.Show.12">
+                  <p:embed/>
+                  <p:pic>
+                    <p:nvPicPr>
+                      <p:cNvPr id="0" name=""/>
+                      <p:cNvPicPr/>
+                      <p:nvPr/>
+                    </p:nvPicPr>
+                    <p:blipFill>
+                      <a:blip r:embed="rId5"/>
+                      <a:stretch>
+                        <a:fillRect/>
+                      </a:stretch>
+                    </p:blipFill>
+                    <p:spPr>
+                      <a:xfrm>
+                        <a:off x="1416050" y="230188"/>
+                        <a:ext cx="6096000" cy="3429000"/>
+                      </a:xfrm>
+                      <a:prstGeom prst="rect">
+                        <a:avLst/>
+                      </a:prstGeom>
+                    </p:spPr>
+                  </p:pic>
+                </p:oleObj>
+              </mc:Fallback>
+            </mc:AlternateContent>
+          </a:graphicData>
+        </a:graphic>
+      </p:graphicFrame>
+      <p:graphicFrame>
+        <p:nvGraphicFramePr>
+          <p:cNvPr id="3" name="Object 2">
+            <a:hlinkClick r:id="" action="ppaction://ole?verb=0"/>
+            <a:extLst>
+              <a:ext uri="{FF2B5EF4-FFF2-40B4-BE49-F238E27FC236}">
+                <a16:creationId xmlns:a16="http://schemas.microsoft.com/office/drawing/2014/main" id="{A640A0E1-730B-462D-92A5-33B98BC8D633}"/>
+              </a:ext>
+            </a:extLst>
+          </p:cNvPr>
+          <p:cNvGraphicFramePr>
+            <a:graphicFrameLocks noChangeAspect="1"/>
+          </p:cNvGraphicFramePr>
+          <p:nvPr>
+            <p:extLst>
+              <p:ext uri="{D42A27DB-BD31-4B8C-83A1-F6EECF244321}">
+                <p14:modId xmlns:p14="http://schemas.microsoft.com/office/powerpoint/2010/main" val="1777199025"/>
+              </p:ext>
+            </p:extLst>
+          </p:nvPr>
+        </p:nvGraphicFramePr>
+        <p:xfrm>
+          <a:off x="1514475" y="328613"/>
+          <a:ext cx="6096000" cy="3429000"/>
+        </p:xfrm>
+        <a:graphic>
+          <a:graphicData uri="http://schemas.openxmlformats.org/presentationml/2006/ole">
+            <mc:AlternateContent xmlns:mc="http://schemas.openxmlformats.org/markup-compatibility/2006">
+              <mc:Choice xmlns:v="urn:schemas-microsoft-com:vml" Requires="v">
+                <p:oleObj spid="_x0000_s1027" name="Presentation" r:id="rId6" imgW="6096296" imgH="3429229" progId="PowerPoint.Show.12">
+                  <p:embed/>
+                </p:oleObj>
+              </mc:Choice>
+              <mc:Fallback>
+                <p:oleObj name="Presentation" r:id="rId6" imgW="6096296" imgH="3429229" progId="PowerPoint.Show.12">
+                  <p:embed/>
+                  <p:pic>
+                    <p:nvPicPr>
+                      <p:cNvPr id="0" name=""/>
+                      <p:cNvPicPr/>
+                      <p:nvPr/>
+                    </p:nvPicPr>
+                    <p:blipFill>
+                      <a:blip r:embed="rId5"/>
+                      <a:stretch>
+                        <a:fillRect/>
+                      </a:stretch>
+                    </p:blipFill>
+                    <p:spPr>
+                      <a:xfrm>
+                        <a:off x="1514475" y="328613"/>
+                        <a:ext cx="6096000" cy="3429000"/>
+                      </a:xfrm>
+                      <a:prstGeom prst="rect">
+                        <a:avLst/>
+                      </a:prstGeom>
+                    </p:spPr>
+                  </p:pic>
+                </p:oleObj>
+              </mc:Fallback>
+            </mc:AlternateContent>
+          </a:graphicData>
+        </a:graphic>
+      </p:graphicFrame>
+      <p:graphicFrame>
+        <p:nvGraphicFramePr>
+          <p:cNvPr id="6" name="Object 5">
+            <a:hlinkClick r:id="" action="ppaction://ole?verb=0"/>
+            <a:extLst>
+              <a:ext uri="{FF2B5EF4-FFF2-40B4-BE49-F238E27FC236}">
+                <a16:creationId xmlns:a16="http://schemas.microsoft.com/office/drawing/2014/main" id="{ED488D3B-49FE-4780-9BB2-DCA09335E3AB}"/>
+              </a:ext>
+            </a:extLst>
+          </p:cNvPr>
+          <p:cNvGraphicFramePr>
+            <a:graphicFrameLocks noChangeAspect="1"/>
+          </p:cNvGraphicFramePr>
+          <p:nvPr>
+            <p:extLst>
+              <p:ext uri="{D42A27DB-BD31-4B8C-83A1-F6EECF244321}">
+                <p14:modId xmlns:p14="http://schemas.microsoft.com/office/powerpoint/2010/main" val="4089338588"/>
+              </p:ext>
+            </p:extLst>
+          </p:nvPr>
+        </p:nvGraphicFramePr>
+        <p:xfrm>
+          <a:off x="1612900" y="427038"/>
+          <a:ext cx="6096000" cy="3429000"/>
+        </p:xfrm>
+        <a:graphic>
+          <a:graphicData uri="http://schemas.openxmlformats.org/presentationml/2006/ole">
+            <mc:AlternateContent xmlns:mc="http://schemas.openxmlformats.org/markup-compatibility/2006">
+              <mc:Choice xmlns:v="urn:schemas-microsoft-com:vml" Requires="v">
+                <p:oleObj spid="_x0000_s1028" name="Presentation" r:id="rId7" imgW="6096296" imgH="3429229" progId="PowerPoint.Show.12">
+                  <p:embed/>
+                </p:oleObj>
+              </mc:Choice>
+              <mc:Fallback>
+                <p:oleObj name="Presentation" r:id="rId7" imgW="6096296" imgH="3429229" progId="PowerPoint.Show.12">
+                  <p:embed/>
+                  <p:pic>
+                    <p:nvPicPr>
+                      <p:cNvPr id="0" name=""/>
+                      <p:cNvPicPr/>
+                      <p:nvPr/>
+                    </p:nvPicPr>
+                    <p:blipFill>
+                      <a:blip r:embed="rId5"/>
+                      <a:stretch>
+                        <a:fillRect/>
+                      </a:stretch>
+                    </p:blipFill>
+                    <p:spPr>
+                      <a:xfrm>
+                        <a:off x="1612900" y="427038"/>
+                        <a:ext cx="6096000" cy="3429000"/>
+                      </a:xfrm>
+                      <a:prstGeom prst="rect">
+                        <a:avLst/>
+                      </a:prstGeom>
+                    </p:spPr>
+                  </p:pic>
+                </p:oleObj>
+              </mc:Fallback>
+            </mc:AlternateContent>
+          </a:graphicData>
+        </a:graphic>
+      </p:graphicFrame>
+      <p:graphicFrame>
+        <p:nvGraphicFramePr>
+          <p:cNvPr id="7" name="Object 6">
+            <a:hlinkClick r:id="" action="ppaction://ole?verb=0"/>
+            <a:extLst>
+              <a:ext uri="{FF2B5EF4-FFF2-40B4-BE49-F238E27FC236}">
+                <a16:creationId xmlns:a16="http://schemas.microsoft.com/office/drawing/2014/main" id="{5607A327-E822-477F-B5B1-EEF844930BDE}"/>
+              </a:ext>
+            </a:extLst>
+          </p:cNvPr>
+          <p:cNvGraphicFramePr>
+            <a:graphicFrameLocks noChangeAspect="1"/>
+          </p:cNvGraphicFramePr>
+          <p:nvPr>
+            <p:extLst>
+              <p:ext uri="{D42A27DB-BD31-4B8C-83A1-F6EECF244321}">
+                <p14:modId xmlns:p14="http://schemas.microsoft.com/office/powerpoint/2010/main" val="2798621047"/>
+              </p:ext>
+            </p:extLst>
+          </p:nvPr>
+        </p:nvGraphicFramePr>
+        <p:xfrm>
+          <a:off x="1711325" y="525463"/>
+          <a:ext cx="6096000" cy="3429000"/>
+        </p:xfrm>
+        <a:graphic>
+          <a:graphicData uri="http://schemas.openxmlformats.org/presentationml/2006/ole">
+            <mc:AlternateContent xmlns:mc="http://schemas.openxmlformats.org/markup-compatibility/2006">
+              <mc:Choice xmlns:v="urn:schemas-microsoft-com:vml" Requires="v">
+                <p:oleObj spid="_x0000_s1029" name="Presentation" r:id="rId8" imgW="6096296" imgH="3429229" progId="PowerPoint.Show.12">
+                  <p:embed/>
+                </p:oleObj>
+              </mc:Choice>
+              <mc:Fallback>
+                <p:oleObj name="Presentation" r:id="rId8" imgW="6096296" imgH="3429229" progId="PowerPoint.Show.12">
+                  <p:embed/>
+                  <p:pic>
+                    <p:nvPicPr>
+                      <p:cNvPr id="0" name=""/>
+                      <p:cNvPicPr/>
+                      <p:nvPr/>
+                    </p:nvPicPr>
+                    <p:blipFill>
+                      <a:blip r:embed="rId5"/>
+                      <a:stretch>
+                        <a:fillRect/>
+                      </a:stretch>
+                    </p:blipFill>
+                    <p:spPr>
+                      <a:xfrm>
+                        <a:off x="1711325" y="525463"/>
+                        <a:ext cx="6096000" cy="3429000"/>
+                      </a:xfrm>
+                      <a:prstGeom prst="rect">
+                        <a:avLst/>
+                      </a:prstGeom>
+                    </p:spPr>
+                  </p:pic>
+                </p:oleObj>
+              </mc:Fallback>
+            </mc:AlternateContent>
+          </a:graphicData>
+        </a:graphic>
+      </p:graphicFrame>
+      <p:graphicFrame>
+        <p:nvGraphicFramePr>
+          <p:cNvPr id="8" name="Object 7">
+            <a:hlinkClick r:id="" action="ppaction://ole?verb=0"/>
+            <a:extLst>
+              <a:ext uri="{FF2B5EF4-FFF2-40B4-BE49-F238E27FC236}">
+                <a16:creationId xmlns:a16="http://schemas.microsoft.com/office/drawing/2014/main" id="{3C6056C3-DDCB-4430-833D-CC8EFF6DA27E}"/>
+              </a:ext>
+            </a:extLst>
+          </p:cNvPr>
+          <p:cNvGraphicFramePr>
+            <a:graphicFrameLocks noChangeAspect="1"/>
+          </p:cNvGraphicFramePr>
+          <p:nvPr>
+            <p:extLst>
+              <p:ext uri="{D42A27DB-BD31-4B8C-83A1-F6EECF244321}">
+                <p14:modId xmlns:p14="http://schemas.microsoft.com/office/powerpoint/2010/main" val="4077173976"/>
+              </p:ext>
+            </p:extLst>
+          </p:nvPr>
+        </p:nvGraphicFramePr>
+        <p:xfrm>
+          <a:off x="1809750" y="623888"/>
+          <a:ext cx="6096000" cy="3429000"/>
+        </p:xfrm>
+        <a:graphic>
+          <a:graphicData uri="http://schemas.openxmlformats.org/presentationml/2006/ole">
+            <mc:AlternateContent xmlns:mc="http://schemas.openxmlformats.org/markup-compatibility/2006">
+              <mc:Choice xmlns:v="urn:schemas-microsoft-com:vml" Requires="v">
+                <p:oleObj spid="_x0000_s1030" name="Presentation" r:id="rId9" imgW="6096296" imgH="3429229" progId="PowerPoint.Show.12">
+                  <p:embed/>
+                </p:oleObj>
+              </mc:Choice>
+              <mc:Fallback>
+                <p:oleObj name="Presentation" r:id="rId9" imgW="6096296" imgH="3429229" progId="PowerPoint.Show.12">
+                  <p:embed/>
+                  <p:pic>
+                    <p:nvPicPr>
+                      <p:cNvPr id="0" name=""/>
+                      <p:cNvPicPr/>
+                      <p:nvPr/>
+                    </p:nvPicPr>
+                    <p:blipFill>
+                      <a:blip r:embed="rId5"/>
+                      <a:stretch>
+                        <a:fillRect/>
+                      </a:stretch>
+                    </p:blipFill>
+                    <p:spPr>
+                      <a:xfrm>
+                        <a:off x="1809750" y="623888"/>
+                        <a:ext cx="6096000" cy="3429000"/>
+                      </a:xfrm>
+                      <a:prstGeom prst="rect">
+                        <a:avLst/>
+                      </a:prstGeom>
+                    </p:spPr>
+                  </p:pic>
+                </p:oleObj>
+              </mc:Fallback>
+            </mc:AlternateContent>
+          </a:graphicData>
+        </a:graphic>
+      </p:graphicFrame>
+      <p:graphicFrame>
+        <p:nvGraphicFramePr>
+          <p:cNvPr id="9" name="Object 8">
+            <a:hlinkClick r:id="" action="ppaction://ole?verb=0"/>
+            <a:extLst>
+              <a:ext uri="{FF2B5EF4-FFF2-40B4-BE49-F238E27FC236}">
+                <a16:creationId xmlns:a16="http://schemas.microsoft.com/office/drawing/2014/main" id="{1ADA89B2-2987-4364-9C1B-F1E86D40B44C}"/>
+              </a:ext>
+            </a:extLst>
+          </p:cNvPr>
+          <p:cNvGraphicFramePr>
+            <a:graphicFrameLocks noChangeAspect="1"/>
+          </p:cNvGraphicFramePr>
+          <p:nvPr>
+            <p:extLst>
+              <p:ext uri="{D42A27DB-BD31-4B8C-83A1-F6EECF244321}">
+                <p14:modId xmlns:p14="http://schemas.microsoft.com/office/powerpoint/2010/main" val="2273851568"/>
+              </p:ext>
+            </p:extLst>
+          </p:nvPr>
+        </p:nvGraphicFramePr>
+        <p:xfrm>
+          <a:off x="1908175" y="722313"/>
+          <a:ext cx="6096000" cy="3429000"/>
+        </p:xfrm>
+        <a:graphic>
+          <a:graphicData uri="http://schemas.openxmlformats.org/presentationml/2006/ole">
+            <mc:AlternateContent xmlns:mc="http://schemas.openxmlformats.org/markup-compatibility/2006">
+              <mc:Choice xmlns:v="urn:schemas-microsoft-com:vml" Requires="v">
+                <p:oleObj spid="_x0000_s1031" name="Presentation" r:id="rId10" imgW="6096296" imgH="3429229" progId="PowerPoint.Show.12">
+                  <p:embed/>
+                </p:oleObj>
+              </mc:Choice>
+              <mc:Fallback>
+                <p:oleObj name="Presentation" r:id="rId10" imgW="6096296" imgH="3429229" progId="PowerPoint.Show.12">
+                  <p:embed/>
+                  <p:pic>
+                    <p:nvPicPr>
+                      <p:cNvPr id="0" name=""/>
+                      <p:cNvPicPr/>
+                      <p:nvPr/>
+                    </p:nvPicPr>
+                    <p:blipFill>
+                      <a:blip r:embed="rId5"/>
+                      <a:stretch>
+                        <a:fillRect/>
+                      </a:stretch>
+                    </p:blipFill>
+                    <p:spPr>
+                      <a:xfrm>
+                        <a:off x="1908175" y="722313"/>
+                        <a:ext cx="6096000" cy="3429000"/>
+                      </a:xfrm>
+                      <a:prstGeom prst="rect">
+                        <a:avLst/>
+                      </a:prstGeom>
+                    </p:spPr>
+                  </p:pic>
+                </p:oleObj>
+              </mc:Fallback>
+            </mc:AlternateContent>
+          </a:graphicData>
+        </a:graphic>
+      </p:graphicFrame>
+      <p:graphicFrame>
+        <p:nvGraphicFramePr>
+          <p:cNvPr id="10" name="Object 9">
+            <a:hlinkClick r:id="" action="ppaction://ole?verb=0"/>
+            <a:extLst>
+              <a:ext uri="{FF2B5EF4-FFF2-40B4-BE49-F238E27FC236}">
+                <a16:creationId xmlns:a16="http://schemas.microsoft.com/office/drawing/2014/main" id="{4895BA8E-37C9-4BB0-9A03-E590E9E0B784}"/>
+              </a:ext>
+            </a:extLst>
+          </p:cNvPr>
+          <p:cNvGraphicFramePr>
+            <a:graphicFrameLocks noChangeAspect="1"/>
+          </p:cNvGraphicFramePr>
+          <p:nvPr>
+            <p:extLst>
+              <p:ext uri="{D42A27DB-BD31-4B8C-83A1-F6EECF244321}">
+                <p14:modId xmlns:p14="http://schemas.microsoft.com/office/powerpoint/2010/main" val="2143363839"/>
+              </p:ext>
+            </p:extLst>
+          </p:nvPr>
+        </p:nvGraphicFramePr>
+        <p:xfrm>
+          <a:off x="2006600" y="820738"/>
+          <a:ext cx="6096000" cy="3429000"/>
+        </p:xfrm>
+        <a:graphic>
+          <a:graphicData uri="http://schemas.openxmlformats.org/presentationml/2006/ole">
+            <mc:AlternateContent xmlns:mc="http://schemas.openxmlformats.org/markup-compatibility/2006">
+              <mc:Choice xmlns:v="urn:schemas-microsoft-com:vml" Requires="v">
+                <p:oleObj spid="_x0000_s1032" name="Presentation" r:id="rId11" imgW="6096296" imgH="3429229" progId="PowerPoint.Show.12">
+                  <p:embed/>
+                </p:oleObj>
+              </mc:Choice>
+              <mc:Fallback>
+                <p:oleObj name="Presentation" r:id="rId11" imgW="6096296" imgH="3429229" progId="PowerPoint.Show.12">
+                  <p:embed/>
+                  <p:pic>
+                    <p:nvPicPr>
+                      <p:cNvPr id="0" name=""/>
+                      <p:cNvPicPr/>
+                      <p:nvPr/>
+                    </p:nvPicPr>
+                    <p:blipFill>
+                      <a:blip r:embed="rId5"/>
+                      <a:stretch>
+                        <a:fillRect/>
+                      </a:stretch>
+                    </p:blipFill>
+                    <p:spPr>
+                      <a:xfrm>
+                        <a:off x="2006600" y="820738"/>
+                        <a:ext cx="6096000" cy="3429000"/>
+                      </a:xfrm>
+                      <a:prstGeom prst="rect">
+                        <a:avLst/>
+                      </a:prstGeom>
+                    </p:spPr>
+                  </p:pic>
+                </p:oleObj>
+              </mc:Fallback>
+            </mc:AlternateContent>
+          </a:graphicData>
+        </a:graphic>
+      </p:graphicFrame>
+      <p:graphicFrame>
+        <p:nvGraphicFramePr>
+          <p:cNvPr id="11" name="Object 10">
+            <a:hlinkClick r:id="" action="ppaction://ole?verb=0"/>
+            <a:extLst>
+              <a:ext uri="{FF2B5EF4-FFF2-40B4-BE49-F238E27FC236}">
+                <a16:creationId xmlns:a16="http://schemas.microsoft.com/office/drawing/2014/main" id="{A61BF896-AEDF-434F-A262-FEAD74A0E5D9}"/>
+              </a:ext>
+            </a:extLst>
+          </p:cNvPr>
+          <p:cNvGraphicFramePr>
+            <a:graphicFrameLocks noChangeAspect="1"/>
+          </p:cNvGraphicFramePr>
+          <p:nvPr>
+            <p:extLst>
+              <p:ext uri="{D42A27DB-BD31-4B8C-83A1-F6EECF244321}">
+                <p14:modId xmlns:p14="http://schemas.microsoft.com/office/powerpoint/2010/main" val="957012929"/>
+              </p:ext>
+            </p:extLst>
+          </p:nvPr>
+        </p:nvGraphicFramePr>
+        <p:xfrm>
+          <a:off x="2105025" y="919163"/>
+          <a:ext cx="6096000" cy="3429000"/>
+        </p:xfrm>
+        <a:graphic>
+          <a:graphicData uri="http://schemas.openxmlformats.org/presentationml/2006/ole">
+            <mc:AlternateContent xmlns:mc="http://schemas.openxmlformats.org/markup-compatibility/2006">
+              <mc:Choice xmlns:v="urn:schemas-microsoft-com:vml" Requires="v">
+                <p:oleObj spid="_x0000_s1033" name="Presentation" r:id="rId12" imgW="6096296" imgH="3429229" progId="PowerPoint.Show.12">
+                  <p:embed/>
+                </p:oleObj>
+              </mc:Choice>
+              <mc:Fallback>
+                <p:oleObj name="Presentation" r:id="rId12" imgW="6096296" imgH="3429229" progId="PowerPoint.Show.12">
+                  <p:embed/>
+                  <p:pic>
+                    <p:nvPicPr>
+                      <p:cNvPr id="0" name=""/>
+                      <p:cNvPicPr/>
+                      <p:nvPr/>
+                    </p:nvPicPr>
+                    <p:blipFill>
+                      <a:blip r:embed="rId5"/>
+                      <a:stretch>
+                        <a:fillRect/>
+                      </a:stretch>
+                    </p:blipFill>
+                    <p:spPr>
+                      <a:xfrm>
+                        <a:off x="2105025" y="919163"/>
+                        <a:ext cx="6096000" cy="3429000"/>
+                      </a:xfrm>
+                      <a:prstGeom prst="rect">
+                        <a:avLst/>
+                      </a:prstGeom>
+                    </p:spPr>
+                  </p:pic>
+                </p:oleObj>
+              </mc:Fallback>
+            </mc:AlternateContent>
+          </a:graphicData>
+        </a:graphic>
+      </p:graphicFrame>
+      <p:graphicFrame>
+        <p:nvGraphicFramePr>
+          <p:cNvPr id="12" name="Object 11">
+            <a:hlinkClick r:id="" action="ppaction://ole?verb=0"/>
+            <a:extLst>
+              <a:ext uri="{FF2B5EF4-FFF2-40B4-BE49-F238E27FC236}">
+                <a16:creationId xmlns:a16="http://schemas.microsoft.com/office/drawing/2014/main" id="{ADDD86E1-982B-4C41-996F-0D5081FE5E8A}"/>
+              </a:ext>
+            </a:extLst>
+          </p:cNvPr>
+          <p:cNvGraphicFramePr>
+            <a:graphicFrameLocks noChangeAspect="1"/>
+          </p:cNvGraphicFramePr>
+          <p:nvPr>
+            <p:extLst>
+              <p:ext uri="{D42A27DB-BD31-4B8C-83A1-F6EECF244321}">
+                <p14:modId xmlns:p14="http://schemas.microsoft.com/office/powerpoint/2010/main" val="1569111089"/>
+              </p:ext>
+            </p:extLst>
+          </p:nvPr>
+        </p:nvGraphicFramePr>
+        <p:xfrm>
+          <a:off x="2203450" y="1017588"/>
+          <a:ext cx="6096000" cy="3429000"/>
+        </p:xfrm>
+        <a:graphic>
+          <a:graphicData uri="http://schemas.openxmlformats.org/presentationml/2006/ole">
+            <mc:AlternateContent xmlns:mc="http://schemas.openxmlformats.org/markup-compatibility/2006">
+              <mc:Choice xmlns:v="urn:schemas-microsoft-com:vml" Requires="v">
+                <p:oleObj spid="_x0000_s1034" name="Presentation" r:id="rId13" imgW="6096296" imgH="3429229" progId="PowerPoint.Show.12">
+                  <p:embed/>
+                </p:oleObj>
+              </mc:Choice>
+              <mc:Fallback>
+                <p:oleObj name="Presentation" r:id="rId13" imgW="6096296" imgH="3429229" progId="PowerPoint.Show.12">
+                  <p:embed/>
+                  <p:pic>
+                    <p:nvPicPr>
+                      <p:cNvPr id="0" name=""/>
+                      <p:cNvPicPr/>
+                      <p:nvPr/>
+                    </p:nvPicPr>
+                    <p:blipFill>
+                      <a:blip r:embed="rId5"/>
+                      <a:stretch>
+                        <a:fillRect/>
+                      </a:stretch>
+                    </p:blipFill>
+                    <p:spPr>
+                      <a:xfrm>
+                        <a:off x="2203450" y="1017588"/>
+                        <a:ext cx="6096000" cy="3429000"/>
+                      </a:xfrm>
+                      <a:prstGeom prst="rect">
+                        <a:avLst/>
+                      </a:prstGeom>
+                    </p:spPr>
+                  </p:pic>
+                </p:oleObj>
+              </mc:Fallback>
+            </mc:AlternateContent>
+          </a:graphicData>
+        </a:graphic>
+      </p:graphicFrame>
+      <p:graphicFrame>
+        <p:nvGraphicFramePr>
+          <p:cNvPr id="13" name="Object 12">
+            <a:hlinkClick r:id="" action="ppaction://ole?verb=0"/>
+            <a:extLst>
+              <a:ext uri="{FF2B5EF4-FFF2-40B4-BE49-F238E27FC236}">
+                <a16:creationId xmlns:a16="http://schemas.microsoft.com/office/drawing/2014/main" id="{F967D396-C552-43B4-9A04-F3B3156F401E}"/>
+              </a:ext>
+            </a:extLst>
+          </p:cNvPr>
+          <p:cNvGraphicFramePr>
+            <a:graphicFrameLocks noChangeAspect="1"/>
+          </p:cNvGraphicFramePr>
+          <p:nvPr>
+            <p:extLst>
+              <p:ext uri="{D42A27DB-BD31-4B8C-83A1-F6EECF244321}">
+                <p14:modId xmlns:p14="http://schemas.microsoft.com/office/powerpoint/2010/main" val="1236442995"/>
+              </p:ext>
+            </p:extLst>
+          </p:nvPr>
+        </p:nvGraphicFramePr>
+        <p:xfrm>
+          <a:off x="2301875" y="1116013"/>
+          <a:ext cx="6096000" cy="3429000"/>
+        </p:xfrm>
+        <a:graphic>
+          <a:graphicData uri="http://schemas.openxmlformats.org/presentationml/2006/ole">
+            <mc:AlternateContent xmlns:mc="http://schemas.openxmlformats.org/markup-compatibility/2006">
+              <mc:Choice xmlns:v="urn:schemas-microsoft-com:vml" Requires="v">
+                <p:oleObj spid="_x0000_s1035" name="Presentation" r:id="rId14" imgW="6096296" imgH="3429229" progId="PowerPoint.Show.12">
+                  <p:embed/>
+                </p:oleObj>
+              </mc:Choice>
+              <mc:Fallback>
+                <p:oleObj name="Presentation" r:id="rId14" imgW="6096296" imgH="3429229" progId="PowerPoint.Show.12">
+                  <p:embed/>
+                  <p:pic>
+                    <p:nvPicPr>
+                      <p:cNvPr id="0" name=""/>
+                      <p:cNvPicPr/>
+                      <p:nvPr/>
+                    </p:nvPicPr>
+                    <p:blipFill>
+                      <a:blip r:embed="rId5"/>
+                      <a:stretch>
+                        <a:fillRect/>
+                      </a:stretch>
+                    </p:blipFill>
+                    <p:spPr>
+                      <a:xfrm>
+                        <a:off x="2301875" y="1116013"/>
+                        <a:ext cx="6096000" cy="3429000"/>
+                      </a:xfrm>
+                      <a:prstGeom prst="rect">
+                        <a:avLst/>
+                      </a:prstGeom>
+                    </p:spPr>
+                  </p:pic>
+                </p:oleObj>
+              </mc:Fallback>
+            </mc:AlternateContent>
+          </a:graphicData>
+        </a:graphic>
+      </p:graphicFrame>
     </p:spTree>
   </p:cSld>
   <p:clrMapOvr>

</xml_diff>